<commit_message>
updated based on feedback
</commit_message>
<xml_diff>
--- a/projects/capstone/model-design-overview.pptx
+++ b/projects/capstone/model-design-overview.pptx
@@ -6,6 +6,7 @@
   </p:sldMasterIdLst>
   <p:sldIdLst>
     <p:sldId id="256" r:id="rId2"/>
+    <p:sldId id="257" r:id="rId3"/>
   </p:sldIdLst>
   <p:sldSz cx="12192000" cy="6858000"/>
   <p:notesSz cx="6858000" cy="9144000"/>
@@ -104,6 +105,11 @@
       </a:defRPr>
     </a:lvl9pPr>
   </p:defaultTextStyle>
+  <p:extLst>
+    <p:ext uri="{EFAFB233-063F-42B5-8137-9DF3F51BA10A}">
+      <p15:sldGuideLst xmlns:p15="http://schemas.microsoft.com/office/powerpoint/2012/main"/>
+    </p:ext>
+  </p:extLst>
 </p:presentation>
 </file>
 
@@ -254,7 +260,7 @@
           <a:p>
             <a:fld id="{160149AF-E75C-4733-8184-362481B3E1F2}" type="datetimeFigureOut">
               <a:rPr lang="en-US" smtClean="0"/>
-              <a:t>4/1/2018</a:t>
+              <a:t>4/3/2018</a:t>
             </a:fld>
             <a:endParaRPr lang="en-US"/>
           </a:p>
@@ -452,7 +458,7 @@
           <a:p>
             <a:fld id="{160149AF-E75C-4733-8184-362481B3E1F2}" type="datetimeFigureOut">
               <a:rPr lang="en-US" smtClean="0"/>
-              <a:t>4/1/2018</a:t>
+              <a:t>4/3/2018</a:t>
             </a:fld>
             <a:endParaRPr lang="en-US"/>
           </a:p>
@@ -660,7 +666,7 @@
           <a:p>
             <a:fld id="{160149AF-E75C-4733-8184-362481B3E1F2}" type="datetimeFigureOut">
               <a:rPr lang="en-US" smtClean="0"/>
-              <a:t>4/1/2018</a:t>
+              <a:t>4/3/2018</a:t>
             </a:fld>
             <a:endParaRPr lang="en-US"/>
           </a:p>
@@ -858,7 +864,7 @@
           <a:p>
             <a:fld id="{160149AF-E75C-4733-8184-362481B3E1F2}" type="datetimeFigureOut">
               <a:rPr lang="en-US" smtClean="0"/>
-              <a:t>4/1/2018</a:t>
+              <a:t>4/3/2018</a:t>
             </a:fld>
             <a:endParaRPr lang="en-US"/>
           </a:p>
@@ -1133,7 +1139,7 @@
           <a:p>
             <a:fld id="{160149AF-E75C-4733-8184-362481B3E1F2}" type="datetimeFigureOut">
               <a:rPr lang="en-US" smtClean="0"/>
-              <a:t>4/1/2018</a:t>
+              <a:t>4/3/2018</a:t>
             </a:fld>
             <a:endParaRPr lang="en-US"/>
           </a:p>
@@ -1398,7 +1404,7 @@
           <a:p>
             <a:fld id="{160149AF-E75C-4733-8184-362481B3E1F2}" type="datetimeFigureOut">
               <a:rPr lang="en-US" smtClean="0"/>
-              <a:t>4/1/2018</a:t>
+              <a:t>4/3/2018</a:t>
             </a:fld>
             <a:endParaRPr lang="en-US"/>
           </a:p>
@@ -1810,7 +1816,7 @@
           <a:p>
             <a:fld id="{160149AF-E75C-4733-8184-362481B3E1F2}" type="datetimeFigureOut">
               <a:rPr lang="en-US" smtClean="0"/>
-              <a:t>4/1/2018</a:t>
+              <a:t>4/3/2018</a:t>
             </a:fld>
             <a:endParaRPr lang="en-US"/>
           </a:p>
@@ -1951,7 +1957,7 @@
           <a:p>
             <a:fld id="{160149AF-E75C-4733-8184-362481B3E1F2}" type="datetimeFigureOut">
               <a:rPr lang="en-US" smtClean="0"/>
-              <a:t>4/1/2018</a:t>
+              <a:t>4/3/2018</a:t>
             </a:fld>
             <a:endParaRPr lang="en-US"/>
           </a:p>
@@ -2064,7 +2070,7 @@
           <a:p>
             <a:fld id="{160149AF-E75C-4733-8184-362481B3E1F2}" type="datetimeFigureOut">
               <a:rPr lang="en-US" smtClean="0"/>
-              <a:t>4/1/2018</a:t>
+              <a:t>4/3/2018</a:t>
             </a:fld>
             <a:endParaRPr lang="en-US"/>
           </a:p>
@@ -2375,7 +2381,7 @@
           <a:p>
             <a:fld id="{160149AF-E75C-4733-8184-362481B3E1F2}" type="datetimeFigureOut">
               <a:rPr lang="en-US" smtClean="0"/>
-              <a:t>4/1/2018</a:t>
+              <a:t>4/3/2018</a:t>
             </a:fld>
             <a:endParaRPr lang="en-US"/>
           </a:p>
@@ -2663,7 +2669,7 @@
           <a:p>
             <a:fld id="{160149AF-E75C-4733-8184-362481B3E1F2}" type="datetimeFigureOut">
               <a:rPr lang="en-US" smtClean="0"/>
-              <a:t>4/1/2018</a:t>
+              <a:t>4/3/2018</a:t>
             </a:fld>
             <a:endParaRPr lang="en-US"/>
           </a:p>
@@ -2904,7 +2910,7 @@
           <a:p>
             <a:fld id="{160149AF-E75C-4733-8184-362481B3E1F2}" type="datetimeFigureOut">
               <a:rPr lang="en-US" smtClean="0"/>
-              <a:t>4/1/2018</a:t>
+              <a:t>4/3/2018</a:t>
             </a:fld>
             <a:endParaRPr lang="en-US"/>
           </a:p>
@@ -4387,6 +4393,859 @@
 </p:sld>
 </file>
 
+<file path=ppt/slides/slide2.xml><?xml version="1.0" encoding="utf-8"?>
+<p:sld xmlns:a="http://schemas.openxmlformats.org/drawingml/2006/main" xmlns:r="http://schemas.openxmlformats.org/officeDocument/2006/relationships" xmlns:p="http://schemas.openxmlformats.org/presentationml/2006/main">
+  <p:cSld>
+    <p:spTree>
+      <p:nvGrpSpPr>
+        <p:cNvPr id="1" name=""/>
+        <p:cNvGrpSpPr/>
+        <p:nvPr/>
+      </p:nvGrpSpPr>
+      <p:grpSpPr>
+        <a:xfrm>
+          <a:off x="0" y="0"/>
+          <a:ext cx="0" cy="0"/>
+          <a:chOff x="0" y="0"/>
+          <a:chExt cx="0" cy="0"/>
+        </a:xfrm>
+      </p:grpSpPr>
+      <p:graphicFrame>
+        <p:nvGraphicFramePr>
+          <p:cNvPr id="4" name="Table 3">
+            <a:extLst>
+              <a:ext uri="{FF2B5EF4-FFF2-40B4-BE49-F238E27FC236}">
+                <a16:creationId xmlns:a16="http://schemas.microsoft.com/office/drawing/2014/main" id="{B1FF6ECF-4737-45BA-9E81-7BB581E4E230}"/>
+              </a:ext>
+            </a:extLst>
+          </p:cNvPr>
+          <p:cNvGraphicFramePr>
+            <a:graphicFrameLocks noGrp="1"/>
+          </p:cNvGraphicFramePr>
+          <p:nvPr>
+            <p:extLst>
+              <p:ext uri="{D42A27DB-BD31-4B8C-83A1-F6EECF244321}">
+                <p14:modId xmlns:p14="http://schemas.microsoft.com/office/powerpoint/2010/main" val="1203427150"/>
+              </p:ext>
+            </p:extLst>
+          </p:nvPr>
+        </p:nvGraphicFramePr>
+        <p:xfrm>
+          <a:off x="1490487" y="1583853"/>
+          <a:ext cx="1657425" cy="1854200"/>
+        </p:xfrm>
+        <a:graphic>
+          <a:graphicData uri="http://schemas.openxmlformats.org/drawingml/2006/table">
+            <a:tbl>
+              <a:tblPr firstRow="1" bandRow="1">
+                <a:tableStyleId>{5940675A-B579-460E-94D1-54222C63F5DA}</a:tableStyleId>
+              </a:tblPr>
+              <a:tblGrid>
+                <a:gridCol w="357018">
+                  <a:extLst>
+                    <a:ext uri="{9D8B030D-6E8A-4147-A177-3AD203B41FA5}">
+                      <a16:colId xmlns:a16="http://schemas.microsoft.com/office/drawing/2014/main" val="802782641"/>
+                    </a:ext>
+                  </a:extLst>
+                </a:gridCol>
+                <a:gridCol w="341415">
+                  <a:extLst>
+                    <a:ext uri="{9D8B030D-6E8A-4147-A177-3AD203B41FA5}">
+                      <a16:colId xmlns:a16="http://schemas.microsoft.com/office/drawing/2014/main" val="1233535274"/>
+                    </a:ext>
+                  </a:extLst>
+                </a:gridCol>
+                <a:gridCol w="319664">
+                  <a:extLst>
+                    <a:ext uri="{9D8B030D-6E8A-4147-A177-3AD203B41FA5}">
+                      <a16:colId xmlns:a16="http://schemas.microsoft.com/office/drawing/2014/main" val="2631151130"/>
+                    </a:ext>
+                  </a:extLst>
+                </a:gridCol>
+                <a:gridCol w="319664">
+                  <a:extLst>
+                    <a:ext uri="{9D8B030D-6E8A-4147-A177-3AD203B41FA5}">
+                      <a16:colId xmlns:a16="http://schemas.microsoft.com/office/drawing/2014/main" val="2941530002"/>
+                    </a:ext>
+                  </a:extLst>
+                </a:gridCol>
+                <a:gridCol w="319664">
+                  <a:extLst>
+                    <a:ext uri="{9D8B030D-6E8A-4147-A177-3AD203B41FA5}">
+                      <a16:colId xmlns:a16="http://schemas.microsoft.com/office/drawing/2014/main" val="3737301906"/>
+                    </a:ext>
+                  </a:extLst>
+                </a:gridCol>
+              </a:tblGrid>
+              <a:tr h="370840">
+                <a:tc>
+                  <a:txBody>
+                    <a:bodyPr/>
+                    <a:lstStyle/>
+                    <a:p>
+                      <a:pPr algn="ctr"/>
+                      <a:r>
+                        <a:rPr lang="en-US" dirty="0"/>
+                        <a:t>1</a:t>
+                      </a:r>
+                    </a:p>
+                  </a:txBody>
+                  <a:tcPr>
+                    <a:solidFill>
+                      <a:schemeClr val="accent5">
+                        <a:lumMod val="20000"/>
+                        <a:lumOff val="80000"/>
+                      </a:schemeClr>
+                    </a:solidFill>
+                  </a:tcPr>
+                </a:tc>
+                <a:tc>
+                  <a:txBody>
+                    <a:bodyPr/>
+                    <a:lstStyle/>
+                    <a:p>
+                      <a:pPr algn="ctr"/>
+                      <a:r>
+                        <a:rPr lang="en-US" dirty="0"/>
+                        <a:t>3</a:t>
+                      </a:r>
+                    </a:p>
+                  </a:txBody>
+                  <a:tcPr>
+                    <a:solidFill>
+                      <a:schemeClr val="accent5">
+                        <a:lumMod val="20000"/>
+                        <a:lumOff val="80000"/>
+                      </a:schemeClr>
+                    </a:solidFill>
+                  </a:tcPr>
+                </a:tc>
+                <a:tc>
+                  <a:txBody>
+                    <a:bodyPr/>
+                    <a:lstStyle/>
+                    <a:p>
+                      <a:pPr algn="ctr"/>
+                      <a:r>
+                        <a:rPr lang="en-US" dirty="0"/>
+                        <a:t>2</a:t>
+                      </a:r>
+                    </a:p>
+                  </a:txBody>
+                  <a:tcPr>
+                    <a:solidFill>
+                      <a:schemeClr val="accent5">
+                        <a:lumMod val="20000"/>
+                        <a:lumOff val="80000"/>
+                      </a:schemeClr>
+                    </a:solidFill>
+                  </a:tcPr>
+                </a:tc>
+                <a:tc>
+                  <a:txBody>
+                    <a:bodyPr/>
+                    <a:lstStyle/>
+                    <a:p>
+                      <a:pPr algn="ctr"/>
+                      <a:endParaRPr lang="en-US" dirty="0"/>
+                    </a:p>
+                  </a:txBody>
+                  <a:tcPr/>
+                </a:tc>
+                <a:tc>
+                  <a:txBody>
+                    <a:bodyPr/>
+                    <a:lstStyle/>
+                    <a:p>
+                      <a:pPr algn="ctr"/>
+                      <a:endParaRPr lang="en-US" dirty="0"/>
+                    </a:p>
+                  </a:txBody>
+                  <a:tcPr/>
+                </a:tc>
+                <a:extLst>
+                  <a:ext uri="{0D108BD9-81ED-4DB2-BD59-A6C34878D82A}">
+                    <a16:rowId xmlns:a16="http://schemas.microsoft.com/office/drawing/2014/main" val="2534469076"/>
+                  </a:ext>
+                </a:extLst>
+              </a:tr>
+              <a:tr h="370840">
+                <a:tc>
+                  <a:txBody>
+                    <a:bodyPr/>
+                    <a:lstStyle/>
+                    <a:p>
+                      <a:pPr algn="ctr"/>
+                      <a:r>
+                        <a:rPr lang="en-US" dirty="0"/>
+                        <a:t>7</a:t>
+                      </a:r>
+                    </a:p>
+                  </a:txBody>
+                  <a:tcPr>
+                    <a:solidFill>
+                      <a:schemeClr val="accent5">
+                        <a:lumMod val="20000"/>
+                        <a:lumOff val="80000"/>
+                      </a:schemeClr>
+                    </a:solidFill>
+                  </a:tcPr>
+                </a:tc>
+                <a:tc>
+                  <a:txBody>
+                    <a:bodyPr/>
+                    <a:lstStyle/>
+                    <a:p>
+                      <a:pPr algn="ctr"/>
+                      <a:r>
+                        <a:rPr lang="en-US" dirty="0"/>
+                        <a:t>6</a:t>
+                      </a:r>
+                    </a:p>
+                  </a:txBody>
+                  <a:tcPr>
+                    <a:solidFill>
+                      <a:schemeClr val="accent5">
+                        <a:lumMod val="20000"/>
+                        <a:lumOff val="80000"/>
+                      </a:schemeClr>
+                    </a:solidFill>
+                  </a:tcPr>
+                </a:tc>
+                <a:tc>
+                  <a:txBody>
+                    <a:bodyPr/>
+                    <a:lstStyle/>
+                    <a:p>
+                      <a:pPr algn="ctr"/>
+                      <a:r>
+                        <a:rPr lang="en-US" dirty="0"/>
+                        <a:t>6</a:t>
+                      </a:r>
+                    </a:p>
+                  </a:txBody>
+                  <a:tcPr>
+                    <a:solidFill>
+                      <a:schemeClr val="accent5">
+                        <a:lumMod val="20000"/>
+                        <a:lumOff val="80000"/>
+                      </a:schemeClr>
+                    </a:solidFill>
+                  </a:tcPr>
+                </a:tc>
+                <a:tc>
+                  <a:txBody>
+                    <a:bodyPr/>
+                    <a:lstStyle/>
+                    <a:p>
+                      <a:pPr algn="ctr"/>
+                      <a:endParaRPr lang="en-US" dirty="0"/>
+                    </a:p>
+                  </a:txBody>
+                  <a:tcPr/>
+                </a:tc>
+                <a:tc>
+                  <a:txBody>
+                    <a:bodyPr/>
+                    <a:lstStyle/>
+                    <a:p>
+                      <a:pPr algn="ctr"/>
+                      <a:endParaRPr lang="en-US" dirty="0"/>
+                    </a:p>
+                  </a:txBody>
+                  <a:tcPr/>
+                </a:tc>
+                <a:extLst>
+                  <a:ext uri="{0D108BD9-81ED-4DB2-BD59-A6C34878D82A}">
+                    <a16:rowId xmlns:a16="http://schemas.microsoft.com/office/drawing/2014/main" val="4208396838"/>
+                  </a:ext>
+                </a:extLst>
+              </a:tr>
+              <a:tr h="370840">
+                <a:tc>
+                  <a:txBody>
+                    <a:bodyPr/>
+                    <a:lstStyle/>
+                    <a:p>
+                      <a:pPr algn="ctr"/>
+                      <a:r>
+                        <a:rPr lang="en-US" dirty="0"/>
+                        <a:t>5</a:t>
+                      </a:r>
+                    </a:p>
+                  </a:txBody>
+                  <a:tcPr>
+                    <a:solidFill>
+                      <a:schemeClr val="accent5">
+                        <a:lumMod val="20000"/>
+                        <a:lumOff val="80000"/>
+                      </a:schemeClr>
+                    </a:solidFill>
+                  </a:tcPr>
+                </a:tc>
+                <a:tc>
+                  <a:txBody>
+                    <a:bodyPr/>
+                    <a:lstStyle/>
+                    <a:p>
+                      <a:pPr algn="ctr"/>
+                      <a:r>
+                        <a:rPr lang="en-US" dirty="0"/>
+                        <a:t>3</a:t>
+                      </a:r>
+                    </a:p>
+                  </a:txBody>
+                  <a:tcPr>
+                    <a:solidFill>
+                      <a:schemeClr val="accent5">
+                        <a:lumMod val="20000"/>
+                        <a:lumOff val="80000"/>
+                      </a:schemeClr>
+                    </a:solidFill>
+                  </a:tcPr>
+                </a:tc>
+                <a:tc>
+                  <a:txBody>
+                    <a:bodyPr/>
+                    <a:lstStyle/>
+                    <a:p>
+                      <a:pPr algn="ctr"/>
+                      <a:r>
+                        <a:rPr lang="en-US" dirty="0"/>
+                        <a:t>2</a:t>
+                      </a:r>
+                    </a:p>
+                  </a:txBody>
+                  <a:tcPr>
+                    <a:solidFill>
+                      <a:schemeClr val="accent5">
+                        <a:lumMod val="20000"/>
+                        <a:lumOff val="80000"/>
+                      </a:schemeClr>
+                    </a:solidFill>
+                  </a:tcPr>
+                </a:tc>
+                <a:tc>
+                  <a:txBody>
+                    <a:bodyPr/>
+                    <a:lstStyle/>
+                    <a:p>
+                      <a:pPr algn="ctr"/>
+                      <a:endParaRPr lang="en-US" dirty="0"/>
+                    </a:p>
+                  </a:txBody>
+                  <a:tcPr/>
+                </a:tc>
+                <a:tc>
+                  <a:txBody>
+                    <a:bodyPr/>
+                    <a:lstStyle/>
+                    <a:p>
+                      <a:pPr algn="ctr"/>
+                      <a:endParaRPr lang="en-US" dirty="0"/>
+                    </a:p>
+                  </a:txBody>
+                  <a:tcPr/>
+                </a:tc>
+                <a:extLst>
+                  <a:ext uri="{0D108BD9-81ED-4DB2-BD59-A6C34878D82A}">
+                    <a16:rowId xmlns:a16="http://schemas.microsoft.com/office/drawing/2014/main" val="3045981898"/>
+                  </a:ext>
+                </a:extLst>
+              </a:tr>
+              <a:tr h="370840">
+                <a:tc>
+                  <a:txBody>
+                    <a:bodyPr/>
+                    <a:lstStyle/>
+                    <a:p>
+                      <a:pPr algn="ctr"/>
+                      <a:endParaRPr lang="en-US" dirty="0"/>
+                    </a:p>
+                  </a:txBody>
+                  <a:tcPr/>
+                </a:tc>
+                <a:tc>
+                  <a:txBody>
+                    <a:bodyPr/>
+                    <a:lstStyle/>
+                    <a:p>
+                      <a:pPr algn="ctr"/>
+                      <a:endParaRPr lang="en-US" dirty="0"/>
+                    </a:p>
+                  </a:txBody>
+                  <a:tcPr/>
+                </a:tc>
+                <a:tc>
+                  <a:txBody>
+                    <a:bodyPr/>
+                    <a:lstStyle/>
+                    <a:p>
+                      <a:pPr algn="ctr"/>
+                      <a:endParaRPr lang="en-US" dirty="0"/>
+                    </a:p>
+                  </a:txBody>
+                  <a:tcPr/>
+                </a:tc>
+                <a:tc>
+                  <a:txBody>
+                    <a:bodyPr/>
+                    <a:lstStyle/>
+                    <a:p>
+                      <a:pPr algn="ctr"/>
+                      <a:endParaRPr lang="en-US" dirty="0"/>
+                    </a:p>
+                  </a:txBody>
+                  <a:tcPr/>
+                </a:tc>
+                <a:tc>
+                  <a:txBody>
+                    <a:bodyPr/>
+                    <a:lstStyle/>
+                    <a:p>
+                      <a:pPr algn="ctr"/>
+                      <a:endParaRPr lang="en-US" dirty="0"/>
+                    </a:p>
+                  </a:txBody>
+                  <a:tcPr/>
+                </a:tc>
+                <a:extLst>
+                  <a:ext uri="{0D108BD9-81ED-4DB2-BD59-A6C34878D82A}">
+                    <a16:rowId xmlns:a16="http://schemas.microsoft.com/office/drawing/2014/main" val="3774781482"/>
+                  </a:ext>
+                </a:extLst>
+              </a:tr>
+              <a:tr h="370840">
+                <a:tc>
+                  <a:txBody>
+                    <a:bodyPr/>
+                    <a:lstStyle/>
+                    <a:p>
+                      <a:pPr algn="ctr"/>
+                      <a:endParaRPr lang="en-US" dirty="0"/>
+                    </a:p>
+                  </a:txBody>
+                  <a:tcPr/>
+                </a:tc>
+                <a:tc>
+                  <a:txBody>
+                    <a:bodyPr/>
+                    <a:lstStyle/>
+                    <a:p>
+                      <a:pPr algn="ctr"/>
+                      <a:endParaRPr lang="en-US" dirty="0"/>
+                    </a:p>
+                  </a:txBody>
+                  <a:tcPr/>
+                </a:tc>
+                <a:tc>
+                  <a:txBody>
+                    <a:bodyPr/>
+                    <a:lstStyle/>
+                    <a:p>
+                      <a:pPr algn="ctr"/>
+                      <a:endParaRPr lang="en-US" dirty="0"/>
+                    </a:p>
+                  </a:txBody>
+                  <a:tcPr/>
+                </a:tc>
+                <a:tc>
+                  <a:txBody>
+                    <a:bodyPr/>
+                    <a:lstStyle/>
+                    <a:p>
+                      <a:pPr algn="ctr"/>
+                      <a:endParaRPr lang="en-US" dirty="0"/>
+                    </a:p>
+                  </a:txBody>
+                  <a:tcPr/>
+                </a:tc>
+                <a:tc>
+                  <a:txBody>
+                    <a:bodyPr/>
+                    <a:lstStyle/>
+                    <a:p>
+                      <a:pPr algn="ctr"/>
+                      <a:endParaRPr lang="en-US" dirty="0"/>
+                    </a:p>
+                  </a:txBody>
+                  <a:tcPr/>
+                </a:tc>
+                <a:extLst>
+                  <a:ext uri="{0D108BD9-81ED-4DB2-BD59-A6C34878D82A}">
+                    <a16:rowId xmlns:a16="http://schemas.microsoft.com/office/drawing/2014/main" val="984196974"/>
+                  </a:ext>
+                </a:extLst>
+              </a:tr>
+            </a:tbl>
+          </a:graphicData>
+        </a:graphic>
+      </p:graphicFrame>
+      <p:sp>
+        <p:nvSpPr>
+          <p:cNvPr id="5" name="TextBox 4">
+            <a:extLst>
+              <a:ext uri="{FF2B5EF4-FFF2-40B4-BE49-F238E27FC236}">
+                <a16:creationId xmlns:a16="http://schemas.microsoft.com/office/drawing/2014/main" id="{E6E07934-B13E-411C-A4BC-E93332BFDC86}"/>
+              </a:ext>
+            </a:extLst>
+          </p:cNvPr>
+          <p:cNvSpPr txBox="1"/>
+          <p:nvPr/>
+        </p:nvSpPr>
+        <p:spPr>
+          <a:xfrm>
+            <a:off x="3204882" y="2097741"/>
+            <a:ext cx="300082" cy="369332"/>
+          </a:xfrm>
+          <a:prstGeom prst="rect">
+            <a:avLst/>
+          </a:prstGeom>
+          <a:noFill/>
+        </p:spPr>
+        <p:txBody>
+          <a:bodyPr wrap="square" rtlCol="0">
+            <a:spAutoFit/>
+          </a:bodyPr>
+          <a:lstStyle/>
+          <a:p>
+            <a:r>
+              <a:rPr lang="en-US" dirty="0"/>
+              <a:t>*</a:t>
+            </a:r>
+          </a:p>
+        </p:txBody>
+      </p:sp>
+      <mc:AlternateContent xmlns:mc="http://schemas.openxmlformats.org/markup-compatibility/2006">
+        <mc:Choice xmlns:a14="http://schemas.microsoft.com/office/drawing/2010/main" Requires="a14">
+          <p:sp>
+            <p:nvSpPr>
+              <p:cNvPr id="6" name="TextBox 5">
+                <a:extLst>
+                  <a:ext uri="{FF2B5EF4-FFF2-40B4-BE49-F238E27FC236}">
+                    <a16:creationId xmlns:a16="http://schemas.microsoft.com/office/drawing/2014/main" id="{9107D36F-2455-438A-BFD5-EF84C35EDB80}"/>
+                  </a:ext>
+                </a:extLst>
+              </p:cNvPr>
+              <p:cNvSpPr txBox="1"/>
+              <p:nvPr/>
+            </p:nvSpPr>
+            <p:spPr>
+              <a:xfrm>
+                <a:off x="3612776" y="2066365"/>
+                <a:ext cx="2881751" cy="276999"/>
+              </a:xfrm>
+              <a:prstGeom prst="rect">
+                <a:avLst/>
+              </a:prstGeom>
+              <a:noFill/>
+            </p:spPr>
+            <p:txBody>
+              <a:bodyPr wrap="square" lIns="0" tIns="0" rIns="0" bIns="0" rtlCol="0">
+                <a:spAutoFit/>
+              </a:bodyPr>
+              <a:lstStyle/>
+              <a:p>
+                <a14:m>
+                  <m:oMath xmlns:m="http://schemas.openxmlformats.org/officeDocument/2006/math">
+                    <m:r>
+                      <m:rPr>
+                        <m:sty m:val="p"/>
+                      </m:rPr>
+                      <a:rPr lang="en-US" b="0" i="0" smtClean="0">
+                        <a:latin typeface="Cambria Math" panose="02040503050406030204" pitchFamily="18" charset="0"/>
+                      </a:rPr>
+                      <m:t>max</m:t>
+                    </m:r>
+                    <m:r>
+                      <a:rPr lang="en-US" b="0" i="0" smtClean="0">
+                        <a:latin typeface="Cambria Math" panose="02040503050406030204" pitchFamily="18" charset="0"/>
+                      </a:rPr>
+                      <m:t>_</m:t>
+                    </m:r>
+                    <m:r>
+                      <m:rPr>
+                        <m:sty m:val="p"/>
+                      </m:rPr>
+                      <a:rPr lang="en-US" b="0" i="0" smtClean="0">
+                        <a:latin typeface="Cambria Math" panose="02040503050406030204" pitchFamily="18" charset="0"/>
+                      </a:rPr>
+                      <m:t>pooling</m:t>
+                    </m:r>
+                    <m:r>
+                      <a:rPr lang="en-US" b="0" i="1" smtClean="0">
+                        <a:latin typeface="Cambria Math" panose="02040503050406030204" pitchFamily="18" charset="0"/>
+                      </a:rPr>
+                      <m:t>⁡(</m:t>
+                    </m:r>
+                    <m:r>
+                      <a:rPr lang="en-US" b="0" i="1" smtClean="0">
+                        <a:latin typeface="Cambria Math" panose="02040503050406030204" pitchFamily="18" charset="0"/>
+                      </a:rPr>
+                      <m:t>𝑘𝑒𝑟𝑛𝑒𝑙</m:t>
+                    </m:r>
+                    <m:r>
+                      <a:rPr lang="en-US" b="0" i="1" smtClean="0">
+                        <a:latin typeface="Cambria Math" panose="02040503050406030204" pitchFamily="18" charset="0"/>
+                      </a:rPr>
+                      <m:t>_</m:t>
+                    </m:r>
+                    <m:r>
+                      <a:rPr lang="en-US" b="0" i="1" smtClean="0">
+                        <a:latin typeface="Cambria Math" panose="02040503050406030204" pitchFamily="18" charset="0"/>
+                      </a:rPr>
+                      <m:t>𝑠𝑖𝑧𝑒</m:t>
+                    </m:r>
+                    <m:r>
+                      <a:rPr lang="en-US" b="0" i="1" smtClean="0">
+                        <a:latin typeface="Cambria Math" panose="02040503050406030204" pitchFamily="18" charset="0"/>
+                      </a:rPr>
+                      <m:t>)</m:t>
+                    </m:r>
+                  </m:oMath>
+                </a14:m>
+                <a:r>
+                  <a:rPr lang="en-US" dirty="0"/>
+                  <a:t>  = </a:t>
+                </a:r>
+              </a:p>
+            </p:txBody>
+          </p:sp>
+        </mc:Choice>
+        <mc:Fallback>
+          <p:sp>
+            <p:nvSpPr>
+              <p:cNvPr id="6" name="TextBox 5">
+                <a:extLst>
+                  <a:ext uri="{FF2B5EF4-FFF2-40B4-BE49-F238E27FC236}">
+                    <a16:creationId xmlns:a16="http://schemas.microsoft.com/office/drawing/2014/main" id="{9107D36F-2455-438A-BFD5-EF84C35EDB80}"/>
+                  </a:ext>
+                </a:extLst>
+              </p:cNvPr>
+              <p:cNvSpPr txBox="1">
+                <a:spLocks noRot="1" noChangeAspect="1" noMove="1" noResize="1" noEditPoints="1" noAdjustHandles="1" noChangeArrowheads="1" noChangeShapeType="1" noTextEdit="1"/>
+              </p:cNvSpPr>
+              <p:nvPr/>
+            </p:nvSpPr>
+            <p:spPr>
+              <a:xfrm>
+                <a:off x="3612776" y="2066365"/>
+                <a:ext cx="2881751" cy="276999"/>
+              </a:xfrm>
+              <a:prstGeom prst="rect">
+                <a:avLst/>
+              </a:prstGeom>
+              <a:blipFill>
+                <a:blip r:embed="rId2"/>
+                <a:stretch>
+                  <a:fillRect l="-2119" t="-28889" r="-4237" b="-51111"/>
+                </a:stretch>
+              </a:blipFill>
+            </p:spPr>
+            <p:txBody>
+              <a:bodyPr/>
+              <a:lstStyle/>
+              <a:p>
+                <a:r>
+                  <a:rPr lang="en-US">
+                    <a:noFill/>
+                  </a:rPr>
+                  <a:t> </a:t>
+                </a:r>
+              </a:p>
+            </p:txBody>
+          </p:sp>
+        </mc:Fallback>
+      </mc:AlternateContent>
+      <p:graphicFrame>
+        <p:nvGraphicFramePr>
+          <p:cNvPr id="7" name="Table 6">
+            <a:extLst>
+              <a:ext uri="{FF2B5EF4-FFF2-40B4-BE49-F238E27FC236}">
+                <a16:creationId xmlns:a16="http://schemas.microsoft.com/office/drawing/2014/main" id="{2210FCBA-D0E7-4A88-AC74-BD82547AF34C}"/>
+              </a:ext>
+            </a:extLst>
+          </p:cNvPr>
+          <p:cNvGraphicFramePr>
+            <a:graphicFrameLocks noGrp="1"/>
+          </p:cNvGraphicFramePr>
+          <p:nvPr>
+            <p:extLst>
+              <p:ext uri="{D42A27DB-BD31-4B8C-83A1-F6EECF244321}">
+                <p14:modId xmlns:p14="http://schemas.microsoft.com/office/powerpoint/2010/main" val="1067821164"/>
+              </p:ext>
+            </p:extLst>
+          </p:nvPr>
+        </p:nvGraphicFramePr>
+        <p:xfrm>
+          <a:off x="6714959" y="1603365"/>
+          <a:ext cx="1657425" cy="1112520"/>
+        </p:xfrm>
+        <a:graphic>
+          <a:graphicData uri="http://schemas.openxmlformats.org/drawingml/2006/table">
+            <a:tbl>
+              <a:tblPr firstRow="1" bandRow="1">
+                <a:tableStyleId>{5940675A-B579-460E-94D1-54222C63F5DA}</a:tableStyleId>
+              </a:tblPr>
+              <a:tblGrid>
+                <a:gridCol w="581212">
+                  <a:extLst>
+                    <a:ext uri="{9D8B030D-6E8A-4147-A177-3AD203B41FA5}">
+                      <a16:colId xmlns:a16="http://schemas.microsoft.com/office/drawing/2014/main" val="802782641"/>
+                    </a:ext>
+                  </a:extLst>
+                </a:gridCol>
+                <a:gridCol w="555812">
+                  <a:extLst>
+                    <a:ext uri="{9D8B030D-6E8A-4147-A177-3AD203B41FA5}">
+                      <a16:colId xmlns:a16="http://schemas.microsoft.com/office/drawing/2014/main" val="1233535274"/>
+                    </a:ext>
+                  </a:extLst>
+                </a:gridCol>
+                <a:gridCol w="520401">
+                  <a:extLst>
+                    <a:ext uri="{9D8B030D-6E8A-4147-A177-3AD203B41FA5}">
+                      <a16:colId xmlns:a16="http://schemas.microsoft.com/office/drawing/2014/main" val="2631151130"/>
+                    </a:ext>
+                  </a:extLst>
+                </a:gridCol>
+              </a:tblGrid>
+              <a:tr h="370840">
+                <a:tc>
+                  <a:txBody>
+                    <a:bodyPr/>
+                    <a:lstStyle/>
+                    <a:p>
+                      <a:endParaRPr lang="en-US" dirty="0"/>
+                    </a:p>
+                  </a:txBody>
+                  <a:tcPr/>
+                </a:tc>
+                <a:tc>
+                  <a:txBody>
+                    <a:bodyPr/>
+                    <a:lstStyle/>
+                    <a:p>
+                      <a:endParaRPr lang="en-US" dirty="0"/>
+                    </a:p>
+                  </a:txBody>
+                  <a:tcPr/>
+                </a:tc>
+                <a:tc>
+                  <a:txBody>
+                    <a:bodyPr/>
+                    <a:lstStyle/>
+                    <a:p>
+                      <a:endParaRPr lang="en-US" dirty="0"/>
+                    </a:p>
+                  </a:txBody>
+                  <a:tcPr/>
+                </a:tc>
+                <a:extLst>
+                  <a:ext uri="{0D108BD9-81ED-4DB2-BD59-A6C34878D82A}">
+                    <a16:rowId xmlns:a16="http://schemas.microsoft.com/office/drawing/2014/main" val="2534469076"/>
+                  </a:ext>
+                </a:extLst>
+              </a:tr>
+              <a:tr h="370840">
+                <a:tc>
+                  <a:txBody>
+                    <a:bodyPr/>
+                    <a:lstStyle/>
+                    <a:p>
+                      <a:endParaRPr lang="en-US" dirty="0"/>
+                    </a:p>
+                  </a:txBody>
+                  <a:tcPr/>
+                </a:tc>
+                <a:tc>
+                  <a:txBody>
+                    <a:bodyPr/>
+                    <a:lstStyle/>
+                    <a:p>
+                      <a:pPr algn="ctr"/>
+                      <a:r>
+                        <a:rPr lang="en-US" dirty="0"/>
+                        <a:t>7</a:t>
+                      </a:r>
+                    </a:p>
+                  </a:txBody>
+                  <a:tcPr>
+                    <a:solidFill>
+                      <a:srgbClr val="92D050"/>
+                    </a:solidFill>
+                  </a:tcPr>
+                </a:tc>
+                <a:tc>
+                  <a:txBody>
+                    <a:bodyPr/>
+                    <a:lstStyle/>
+                    <a:p>
+                      <a:endParaRPr lang="en-US" dirty="0"/>
+                    </a:p>
+                  </a:txBody>
+                  <a:tcPr/>
+                </a:tc>
+                <a:extLst>
+                  <a:ext uri="{0D108BD9-81ED-4DB2-BD59-A6C34878D82A}">
+                    <a16:rowId xmlns:a16="http://schemas.microsoft.com/office/drawing/2014/main" val="4208396838"/>
+                  </a:ext>
+                </a:extLst>
+              </a:tr>
+              <a:tr h="370840">
+                <a:tc>
+                  <a:txBody>
+                    <a:bodyPr/>
+                    <a:lstStyle/>
+                    <a:p>
+                      <a:endParaRPr lang="en-US" dirty="0"/>
+                    </a:p>
+                  </a:txBody>
+                  <a:tcPr/>
+                </a:tc>
+                <a:tc>
+                  <a:txBody>
+                    <a:bodyPr/>
+                    <a:lstStyle/>
+                    <a:p>
+                      <a:endParaRPr lang="en-US" dirty="0"/>
+                    </a:p>
+                  </a:txBody>
+                  <a:tcPr/>
+                </a:tc>
+                <a:tc>
+                  <a:txBody>
+                    <a:bodyPr/>
+                    <a:lstStyle/>
+                    <a:p>
+                      <a:endParaRPr lang="en-US" dirty="0"/>
+                    </a:p>
+                  </a:txBody>
+                  <a:tcPr/>
+                </a:tc>
+                <a:extLst>
+                  <a:ext uri="{0D108BD9-81ED-4DB2-BD59-A6C34878D82A}">
+                    <a16:rowId xmlns:a16="http://schemas.microsoft.com/office/drawing/2014/main" val="3045981898"/>
+                  </a:ext>
+                </a:extLst>
+              </a:tr>
+            </a:tbl>
+          </a:graphicData>
+        </a:graphic>
+      </p:graphicFrame>
+    </p:spTree>
+    <p:extLst>
+      <p:ext uri="{BB962C8B-B14F-4D97-AF65-F5344CB8AC3E}">
+        <p14:creationId xmlns:p14="http://schemas.microsoft.com/office/powerpoint/2010/main" val="1249033494"/>
+      </p:ext>
+    </p:extLst>
+  </p:cSld>
+  <p:clrMapOvr>
+    <a:masterClrMapping/>
+  </p:clrMapOvr>
+</p:sld>
+</file>
+
 <file path=ppt/theme/theme1.xml><?xml version="1.0" encoding="utf-8"?>
 <a:theme xmlns:a="http://schemas.openxmlformats.org/drawingml/2006/main" name="Office Theme">
   <a:themeElements>

</xml_diff>